<commit_message>
task(7): updated slides #78 [skip-tests]
</commit_message>
<xml_diff>
--- a/tasks/task7/task7_presentation.pptx
+++ b/tasks/task7/task7_presentation.pptx
@@ -3382,8 +3382,8 @@
           </p:sp>
         </mc:Fallback>
       </mc:AlternateContent>
-      <mc:AlternateContent xmlns:mc="http://schemas.openxmlformats.org/markup-compatibility/2006">
-        <mc:Choice xmlns:a14="http://schemas.microsoft.com/office/drawing/2010/main" Requires="a14">
+      <mc:AlternateContent xmlns:mc="http://schemas.openxmlformats.org/markup-compatibility/2006" xmlns:a14="http://schemas.microsoft.com/office/drawing/2010/main">
+        <mc:Choice Requires="a14">
           <p:sp>
             <p:nvSpPr>
               <p:cNvPr id="8" name="Untertitel 2">
@@ -3645,7 +3645,7 @@
             </p:txBody>
           </p:sp>
         </mc:Choice>
-        <mc:Fallback>
+        <mc:Fallback xmlns="">
           <p:sp>
             <p:nvSpPr>
               <p:cNvPr id="8" name="Untertitel 2">
@@ -8082,7 +8082,7 @@
         <p:spPr>
           <a:xfrm>
             <a:off x="4391347" y="3965792"/>
-            <a:ext cx="3403839" cy="646331"/>
+            <a:ext cx="3403839" cy="923330"/>
           </a:xfrm>
           <a:prstGeom prst="rect">
             <a:avLst/>
@@ -8101,7 +8101,14 @@
             </a:pPr>
             <a:r>
               <a:rPr lang="en-US" dirty="0"/>
-              <a:t>Condition is valid</a:t>
+              <a:t>Condition is equality or </a:t>
+            </a:r>
+            <a:br>
+              <a:rPr lang="en-US" dirty="0"/>
+            </a:br>
+            <a:r>
+              <a:rPr lang="en-US" dirty="0"/>
+              <a:t>conjunction of equalities</a:t>
             </a:r>
           </a:p>
           <a:p>
@@ -9095,7 +9102,7 @@
                 <a:latin typeface="Consolas" panose="020B0609020204030204" pitchFamily="49" charset="0"/>
                 <a:cs typeface="Consolas" panose="020B0609020204030204" pitchFamily="49" charset="0"/>
               </a:rPr>
-              <a:t>group_keys</a:t>
+              <a:t>group_key</a:t>
             </a:r>
             <a:r>
               <a:rPr lang="en-US" dirty="0">
@@ -9163,7 +9170,7 @@
                 <a:latin typeface="Consolas" panose="020B0609020204030204" pitchFamily="49" charset="0"/>
                 <a:cs typeface="Consolas" panose="020B0609020204030204" pitchFamily="49" charset="0"/>
               </a:rPr>
-              <a:t>group_keys</a:t>
+              <a:t>group_key</a:t>
             </a:r>
             <a:r>
               <a:rPr lang="en-US" dirty="0">

</xml_diff>